<commit_message>
Fixed the bib for Day 1.1
</commit_message>
<xml_diff>
--- a/presentations/Day 0/Day0Slides.pptx
+++ b/presentations/Day 0/Day0Slides.pptx
@@ -13,6 +13,7 @@
     <p:sldId id="261" r:id="rId7"/>
     <p:sldId id="262" r:id="rId8"/>
     <p:sldId id="263" r:id="rId9"/>
+    <p:sldId id="264" r:id="rId10"/>
   </p:sldIdLst>
   <p:sldSz cx="12192000" cy="6858000"/>
   <p:notesSz cx="6858000" cy="9144000"/>
@@ -7004,7 +7005,72 @@
             </a:pPr>
             <a:r>
               <a:rPr/>
-              <a:t>We are that which we most frequently do, excelence then, is not an act but a habit. - Will Durant (paraphrasing Aristotle)[@durant1933story]</a:t>
+              <a:t>We are that which we most frequently do, excellence then, is not an act but a habit. - (Durant 1933 paraphrasing Aristotle)</a:t>
+            </a:r>
+          </a:p>
+        </p:txBody>
+      </p:sp>
+    </p:spTree>
+  </p:cSld>
+</p:sld>
+</file>
+
+<file path=ppt/slides/slide9.xml><?xml version="1.0" encoding="utf-8"?>
+<p:sld xmlns:a="http://schemas.openxmlformats.org/drawingml/2006/main" xmlns:r="http://schemas.openxmlformats.org/officeDocument/2006/relationships" xmlns:p="http://schemas.openxmlformats.org/presentationml/2006/main">
+  <p:cSld>
+    <p:spTree>
+      <p:nvGrpSpPr>
+        <p:cNvPr id="1" name=""/>
+        <p:cNvGrpSpPr/>
+        <p:nvPr/>
+      </p:nvGrpSpPr>
+      <p:grpSpPr>
+        <a:xfrm>
+          <a:off x="0" y="0"/>
+          <a:ext cx="0" cy="0"/>
+          <a:chOff x="0" y="0"/>
+          <a:chExt cx="0" cy="0"/>
+        </a:xfrm>
+      </p:grpSpPr>
+      <p:sp>
+        <p:nvSpPr>
+          <p:cNvPr id="3" name="Content Placeholder 2"/>
+          <p:cNvSpPr>
+            <a:spLocks noGrp="1"/>
+          </p:cNvSpPr>
+          <p:nvPr>
+            <p:ph idx="1"/>
+          </p:nvPr>
+        </p:nvSpPr>
+        <p:spPr/>
+        <p:txBody>
+          <a:bodyPr/>
+          <a:lstStyle/>
+          <a:p>
+            <a:pPr lvl="0" indent="0" marL="0">
+              <a:buNone/>
+            </a:pPr>
+            <a:r>
+              <a:rPr/>
+              <a:t>Durant, W. 1933. </a:t>
+            </a:r>
+            <a:r>
+              <a:rPr i="1"/>
+              <a:t>The Story of Philosophy</a:t>
+            </a:r>
+            <a:r>
+              <a:rPr/>
+              <a:t>. </a:t>
+            </a:r>
+            <a:r>
+              <a:rPr>
+                <a:hlinkClick r:id="rId2"/>
+              </a:rPr>
+              <a:t>https://books.google.ie/books?id=IAk7zgEACAAJ</a:t>
+            </a:r>
+            <a:r>
+              <a:rPr/>
+              <a:t>.</a:t>
             </a:r>
           </a:p>
         </p:txBody>

</xml_diff>

<commit_message>
Updated refs and citations
Added to a fdew slides and included some references.
</commit_message>
<xml_diff>
--- a/presentations/Day 0/Day0Slides.pptx
+++ b/presentations/Day 0/Day0Slides.pptx
@@ -6677,22 +6677,11 @@
           </a:p>
           <a:p>
             <a:pPr lvl="0" indent="0" marL="0">
-              <a:spcBef>
-                <a:spcPts val="3000"/>
-              </a:spcBef>
               <a:buNone/>
             </a:pPr>
-          </a:p>
-          <a:p>
-            <a:pPr lvl="0" indent="0" marL="0">
-              <a:spcBef>
-                <a:spcPts val="3000"/>
-              </a:spcBef>
-              <a:buNone/>
-            </a:pPr>
-            <a:r>
-              <a:rPr b="1"/>
-              <a:t>When you think of people who work with computers you might think of people who look like..</a:t>
+            <a:r>
+              <a:rPr/>
+              <a:t>When you think of people who work with computer programming, you may think of people that look like this…</a:t>
             </a:r>
           </a:p>
         </p:txBody>
@@ -6765,22 +6754,11 @@
           <a:lstStyle/>
           <a:p>
             <a:pPr lvl="0" indent="0" marL="0">
-              <a:spcBef>
-                <a:spcPts val="3000"/>
-              </a:spcBef>
               <a:buNone/>
             </a:pPr>
-          </a:p>
-          <a:p>
-            <a:pPr lvl="0" indent="0" marL="0">
-              <a:spcBef>
-                <a:spcPts val="3000"/>
-              </a:spcBef>
-              <a:buNone/>
-            </a:pPr>
-            <a:r>
-              <a:rPr b="1"/>
-              <a:t>or maybe…</a:t>
+            <a:r>
+              <a:rPr/>
+              <a:t>Or maybe like this</a:t>
             </a:r>
           </a:p>
         </p:txBody>
@@ -6938,6 +6916,68 @@
           <a:chExt cx="0" cy="0"/>
         </a:xfrm>
       </p:grpSpPr>
+      <p:sp>
+        <p:nvSpPr>
+          <p:cNvPr id="3" name="Content Placeholder 2"/>
+          <p:cNvSpPr>
+            <a:spLocks noGrp="1"/>
+          </p:cNvSpPr>
+          <p:nvPr>
+            <p:ph idx="1"/>
+          </p:nvPr>
+        </p:nvSpPr>
+        <p:spPr/>
+        <p:txBody>
+          <a:bodyPr/>
+          <a:lstStyle/>
+          <a:p>
+            <a:pPr lvl="0" indent="0" marL="0">
+              <a:spcBef>
+                <a:spcPts val="3000"/>
+              </a:spcBef>
+              <a:buNone/>
+            </a:pPr>
+            <a:r>
+              <a:rPr b="1"/>
+              <a:t>So here’s a couple of quotes that inspired these materials</a:t>
+            </a:r>
+          </a:p>
+          <a:p>
+            <a:pPr lvl="0" indent="0" marL="0">
+              <a:buNone/>
+            </a:pPr>
+            <a:r>
+              <a:rPr/>
+              <a:t>‘The Great Being saith: Regard [humanity] as a mine rich in gems of inestimable value. Education can, alone, cause it to reveal its treasures, and enable mankind to benefit therefrom.’ (Baha’u’llah 19th century)</a:t>
+            </a:r>
+          </a:p>
+          <a:p>
+            <a:pPr lvl="0" indent="0" marL="0">
+              <a:buNone/>
+            </a:pPr>
+            <a:r>
+              <a:rPr/>
+              <a:t>“We are what we </a:t>
+            </a:r>
+            <a:r>
+              <a:rPr i="1"/>
+              <a:t>repeatedly do</a:t>
+            </a:r>
+            <a:r>
+              <a:rPr/>
+              <a:t>. Excellence, therefore, is not an act, but a </a:t>
+            </a:r>
+            <a:r>
+              <a:rPr b="1" i="1"/>
+              <a:t>habit</a:t>
+            </a:r>
+            <a:r>
+              <a:rPr/>
+              <a:t>.” (Durant 1933, paraphrasing Aristotle)</a:t>
+            </a:r>
+          </a:p>
+        </p:txBody>
+      </p:sp>
     </p:spTree>
   </p:cSld>
 </p:sld>
@@ -6962,12 +7002,37 @@
       </p:grpSpPr>
       <p:sp>
         <p:nvSpPr>
+          <p:cNvPr id="2" name="Title 1"/>
+          <p:cNvSpPr>
+            <a:spLocks noGrp="1"/>
+          </p:cNvSpPr>
+          <p:nvPr>
+            <p:ph type="title"/>
+          </p:nvPr>
+        </p:nvSpPr>
+        <p:spPr/>
+        <p:txBody>
+          <a:bodyPr/>
+          <a:lstStyle/>
+          <a:p>
+            <a:pPr lvl="0" indent="0" marL="0">
+              <a:buNone/>
+            </a:pPr>
+            <a:r>
+              <a:rPr/>
+              <a:t>Structure of the course</a:t>
+            </a:r>
+          </a:p>
+        </p:txBody>
+      </p:sp>
+      <p:sp>
+        <p:nvSpPr>
           <p:cNvPr id="3" name="Content Placeholder 2"/>
           <p:cNvSpPr>
             <a:spLocks noGrp="1"/>
           </p:cNvSpPr>
           <p:nvPr>
-            <p:ph idx="1" sz="half"/>
+            <p:ph idx="1"/>
           </p:nvPr>
         </p:nvSpPr>
         <p:spPr/>
@@ -6980,32 +7045,7 @@
             </a:pPr>
             <a:r>
               <a:rPr/>
-              <a:t>So let’s try to keep in mind that …</a:t>
-            </a:r>
-          </a:p>
-        </p:txBody>
-      </p:sp>
-      <p:sp>
-        <p:nvSpPr>
-          <p:cNvPr id="4" name="Content Placeholder 3"/>
-          <p:cNvSpPr>
-            <a:spLocks noGrp="1"/>
-          </p:cNvSpPr>
-          <p:nvPr>
-            <p:ph idx="2" sz="half"/>
-          </p:nvPr>
-        </p:nvSpPr>
-        <p:spPr/>
-        <p:txBody>
-          <a:bodyPr/>
-          <a:lstStyle/>
-          <a:p>
-            <a:pPr lvl="0" indent="0" marL="0">
-              <a:buNone/>
-            </a:pPr>
-            <a:r>
-              <a:rPr/>
-              <a:t>We are that which we most frequently do, excellence then, is not an act but a habit. - (Durant 1933 paraphrasing Aristotle)</a:t>
+              <a:t>Lorem ispsum</a:t>
             </a:r>
           </a:p>
         </p:txBody>
@@ -7034,6 +7074,31 @@
       </p:grpSpPr>
       <p:sp>
         <p:nvSpPr>
+          <p:cNvPr id="2" name="Title 1"/>
+          <p:cNvSpPr>
+            <a:spLocks noGrp="1"/>
+          </p:cNvSpPr>
+          <p:nvPr>
+            <p:ph type="title"/>
+          </p:nvPr>
+        </p:nvSpPr>
+        <p:spPr/>
+        <p:txBody>
+          <a:bodyPr/>
+          <a:lstStyle/>
+          <a:p>
+            <a:pPr lvl="0" indent="0" marL="0">
+              <a:buNone/>
+            </a:pPr>
+            <a:r>
+              <a:rPr/>
+              <a:t>References</a:t>
+            </a:r>
+          </a:p>
+        </p:txBody>
+      </p:sp>
+      <p:sp>
+        <p:nvSpPr>
           <p:cNvPr id="3" name="Content Placeholder 2"/>
           <p:cNvSpPr>
             <a:spLocks noGrp="1"/>
@@ -7046,6 +7111,25 @@
         <p:txBody>
           <a:bodyPr/>
           <a:lstStyle/>
+          <a:p>
+            <a:pPr lvl="0" indent="0" marL="0">
+              <a:buNone/>
+            </a:pPr>
+            <a:r>
+              <a:rPr/>
+              <a:t>Baha’u’llah. 19th century. “Tablet of Baha’u’llah: Lawh-i-Maqsud.” Manuscript. </a:t>
+            </a:r>
+            <a:r>
+              <a:rPr>
+                <a:hlinkClick r:id="rId2"/>
+              </a:rPr>
+              <a:t>https://www.bahai.org/library/authoritative-texts/bahaullah/tablets-bahaullah/5#722342929</a:t>
+            </a:r>
+            <a:r>
+              <a:rPr/>
+              <a:t>.</a:t>
+            </a:r>
+          </a:p>
           <a:p>
             <a:pPr lvl="0" indent="0" marL="0">
               <a:buNone/>
@@ -7064,7 +7148,7 @@
             </a:r>
             <a:r>
               <a:rPr>
-                <a:hlinkClick r:id="rId2"/>
+                <a:hlinkClick r:id="rId3"/>
               </a:rPr>
               <a:t>https://books.google.ie/books?id=IAk7zgEACAAJ</a:t>
             </a:r>

</xml_diff>